<commit_message>
actualización presentación de sistemas
</commit_message>
<xml_diff>
--- a/Sistemas Informaticos/UD1/Trabajo historia sistema informaticos.pptx
+++ b/Sistemas Informaticos/UD1/Trabajo historia sistema informaticos.pptx
@@ -9,6 +9,7 @@
     <p:sldId id="257" r:id="rId3"/>
     <p:sldId id="258" r:id="rId4"/>
     <p:sldId id="259" r:id="rId5"/>
+    <p:sldId id="260" r:id="rId6"/>
   </p:sldIdLst>
   <p:sldSz cx="12192000" cy="6858000"/>
   <p:notesSz cx="6858000" cy="9144000"/>
@@ -118,7 +119,7 @@
 <file path=ppt/revisionInfo.xml><?xml version="1.0" encoding="utf-8"?>
 <p1510:revInfo xmlns:a="http://schemas.openxmlformats.org/drawingml/2006/main" xmlns:r="http://schemas.openxmlformats.org/officeDocument/2006/relationships" xmlns:p1510="http://schemas.microsoft.com/office/powerpoint/2015/10/main">
   <p1510:revLst>
-    <p1510:client id="{C766F9D2-225C-499C-8FD8-FF5D73E24B64}" v="174" dt="2023-09-27T14:23:48.783"/>
+    <p1510:client id="{C766F9D2-225C-499C-8FD8-FF5D73E24B64}" v="179" dt="2023-09-27T19:03:15.486"/>
   </p1510:revLst>
 </p1510:revInfo>
 </file>
@@ -1344,7 +1345,7 @@
   <pc:docChgLst>
     <pc:chgData name="Francisco Martin" userId="559f4d3f8982107f" providerId="LiveId" clId="{C766F9D2-225C-499C-8FD8-FF5D73E24B64}"/>
     <pc:docChg chg="undo custSel addSld delSld modSld modMainMaster">
-      <pc:chgData name="Francisco Martin" userId="559f4d3f8982107f" providerId="LiveId" clId="{C766F9D2-225C-499C-8FD8-FF5D73E24B64}" dt="2023-09-27T14:24:32.501" v="712" actId="1076"/>
+      <pc:chgData name="Francisco Martin" userId="559f4d3f8982107f" providerId="LiveId" clId="{C766F9D2-225C-499C-8FD8-FF5D73E24B64}" dt="2023-09-27T19:04:12.676" v="773" actId="1076"/>
       <pc:docMkLst>
         <pc:docMk/>
       </pc:docMkLst>
@@ -1639,7 +1640,7 @@
         </pc:cxnChg>
       </pc:sldChg>
       <pc:sldChg chg="addSp delSp modSp add mod modTransition">
-        <pc:chgData name="Francisco Martin" userId="559f4d3f8982107f" providerId="LiveId" clId="{C766F9D2-225C-499C-8FD8-FF5D73E24B64}" dt="2023-09-27T14:24:32.501" v="712" actId="1076"/>
+        <pc:chgData name="Francisco Martin" userId="559f4d3f8982107f" providerId="LiveId" clId="{C766F9D2-225C-499C-8FD8-FF5D73E24B64}" dt="2023-09-27T18:55:38.202" v="752" actId="206"/>
         <pc:sldMkLst>
           <pc:docMk/>
           <pc:sldMk cId="2070359962" sldId="259"/>
@@ -1653,6 +1654,22 @@
           </ac:spMkLst>
         </pc:spChg>
         <pc:spChg chg="add mod">
+          <ac:chgData name="Francisco Martin" userId="559f4d3f8982107f" providerId="LiveId" clId="{C766F9D2-225C-499C-8FD8-FF5D73E24B64}" dt="2023-09-27T18:49:55.566" v="745" actId="20577"/>
+          <ac:spMkLst>
+            <pc:docMk/>
+            <pc:sldMk cId="2070359962" sldId="259"/>
+            <ac:spMk id="3" creationId="{89A11176-808E-50D5-24F3-1CE4E0E618E3}"/>
+          </ac:spMkLst>
+        </pc:spChg>
+        <pc:spChg chg="add mod">
+          <ac:chgData name="Francisco Martin" userId="559f4d3f8982107f" providerId="LiveId" clId="{C766F9D2-225C-499C-8FD8-FF5D73E24B64}" dt="2023-09-27T18:54:42.498" v="751" actId="207"/>
+          <ac:spMkLst>
+            <pc:docMk/>
+            <pc:sldMk cId="2070359962" sldId="259"/>
+            <ac:spMk id="4" creationId="{FA656749-8259-EBBB-6F78-A3976723CFE1}"/>
+          </ac:spMkLst>
+        </pc:spChg>
+        <pc:spChg chg="add mod">
           <ac:chgData name="Francisco Martin" userId="559f4d3f8982107f" providerId="LiveId" clId="{C766F9D2-225C-499C-8FD8-FF5D73E24B64}" dt="2023-09-27T14:07:59.727" v="638" actId="164"/>
           <ac:spMkLst>
             <pc:docMk/>
@@ -1669,7 +1686,7 @@
           </ac:spMkLst>
         </pc:spChg>
         <pc:spChg chg="add mod">
-          <ac:chgData name="Francisco Martin" userId="559f4d3f8982107f" providerId="LiveId" clId="{C766F9D2-225C-499C-8FD8-FF5D73E24B64}" dt="2023-09-27T14:22:12.785" v="703" actId="207"/>
+          <ac:chgData name="Francisco Martin" userId="559f4d3f8982107f" providerId="LiveId" clId="{C766F9D2-225C-499C-8FD8-FF5D73E24B64}" dt="2023-09-27T18:55:38.202" v="752" actId="206"/>
           <ac:spMkLst>
             <pc:docMk/>
             <pc:sldMk cId="2070359962" sldId="259"/>
@@ -1828,6 +1845,69 @@
             <ac:cxnSpMk id="20" creationId="{529A13FE-CC88-EBD5-29CF-F8BAD9EECEFF}"/>
           </ac:cxnSpMkLst>
         </pc:cxnChg>
+      </pc:sldChg>
+      <pc:sldChg chg="addSp delSp modSp add mod">
+        <pc:chgData name="Francisco Martin" userId="559f4d3f8982107f" providerId="LiveId" clId="{C766F9D2-225C-499C-8FD8-FF5D73E24B64}" dt="2023-09-27T19:04:12.676" v="773" actId="1076"/>
+        <pc:sldMkLst>
+          <pc:docMk/>
+          <pc:sldMk cId="2271487826" sldId="260"/>
+        </pc:sldMkLst>
+        <pc:spChg chg="del mod">
+          <ac:chgData name="Francisco Martin" userId="559f4d3f8982107f" providerId="LiveId" clId="{C766F9D2-225C-499C-8FD8-FF5D73E24B64}" dt="2023-09-27T19:02:11.733" v="756" actId="478"/>
+          <ac:spMkLst>
+            <pc:docMk/>
+            <pc:sldMk cId="2271487826" sldId="260"/>
+            <ac:spMk id="2" creationId="{65D761A7-5E1A-4363-1EE7-487839A24CB4}"/>
+          </ac:spMkLst>
+        </pc:spChg>
+        <pc:spChg chg="mod">
+          <ac:chgData name="Francisco Martin" userId="559f4d3f8982107f" providerId="LiveId" clId="{C766F9D2-225C-499C-8FD8-FF5D73E24B64}" dt="2023-09-27T19:03:46.910" v="772" actId="1076"/>
+          <ac:spMkLst>
+            <pc:docMk/>
+            <pc:sldMk cId="2271487826" sldId="260"/>
+            <ac:spMk id="3" creationId="{89A11176-808E-50D5-24F3-1CE4E0E618E3}"/>
+          </ac:spMkLst>
+        </pc:spChg>
+        <pc:spChg chg="mod">
+          <ac:chgData name="Francisco Martin" userId="559f4d3f8982107f" providerId="LiveId" clId="{C766F9D2-225C-499C-8FD8-FF5D73E24B64}" dt="2023-09-27T19:04:12.676" v="773" actId="1076"/>
+          <ac:spMkLst>
+            <pc:docMk/>
+            <pc:sldMk cId="2271487826" sldId="260"/>
+            <ac:spMk id="4" creationId="{FA656749-8259-EBBB-6F78-A3976723CFE1}"/>
+          </ac:spMkLst>
+        </pc:spChg>
+        <pc:spChg chg="add mod ord">
+          <ac:chgData name="Francisco Martin" userId="559f4d3f8982107f" providerId="LiveId" clId="{C766F9D2-225C-499C-8FD8-FF5D73E24B64}" dt="2023-09-27T19:03:32.780" v="769" actId="167"/>
+          <ac:spMkLst>
+            <pc:docMk/>
+            <pc:sldMk cId="2271487826" sldId="260"/>
+            <ac:spMk id="5" creationId="{B1F973F9-0C83-7DA6-549A-C2B958781C5B}"/>
+          </ac:spMkLst>
+        </pc:spChg>
+        <pc:spChg chg="mod">
+          <ac:chgData name="Francisco Martin" userId="559f4d3f8982107f" providerId="LiveId" clId="{C766F9D2-225C-499C-8FD8-FF5D73E24B64}" dt="2023-09-27T19:02:29.453" v="760" actId="1076"/>
+          <ac:spMkLst>
+            <pc:docMk/>
+            <pc:sldMk cId="2271487826" sldId="260"/>
+            <ac:spMk id="16" creationId="{B74D8065-916C-C2F8-7443-FEE81D22F0AC}"/>
+          </ac:spMkLst>
+        </pc:spChg>
+        <pc:picChg chg="mod">
+          <ac:chgData name="Francisco Martin" userId="559f4d3f8982107f" providerId="LiveId" clId="{C766F9D2-225C-499C-8FD8-FF5D73E24B64}" dt="2023-09-27T19:02:36.628" v="761" actId="1076"/>
+          <ac:picMkLst>
+            <pc:docMk/>
+            <pc:sldMk cId="2271487826" sldId="260"/>
+            <ac:picMk id="18" creationId="{3E712D82-1072-3190-F07A-618129E3A17D}"/>
+          </ac:picMkLst>
+        </pc:picChg>
+        <pc:picChg chg="mod">
+          <ac:chgData name="Francisco Martin" userId="559f4d3f8982107f" providerId="LiveId" clId="{C766F9D2-225C-499C-8FD8-FF5D73E24B64}" dt="2023-09-27T19:02:25.778" v="759" actId="1076"/>
+          <ac:picMkLst>
+            <pc:docMk/>
+            <pc:sldMk cId="2271487826" sldId="260"/>
+            <ac:picMk id="21" creationId="{3997A5C5-B5FB-A1F3-A6AA-7B216FBA7E86}"/>
+          </ac:picMkLst>
+        </pc:picChg>
       </pc:sldChg>
       <pc:sldMasterChg chg="modTransition modSldLayout">
         <pc:chgData name="Francisco Martin" userId="559f4d3f8982107f" providerId="LiveId" clId="{C766F9D2-225C-499C-8FD8-FF5D73E24B64}" dt="2023-09-27T14:01:21.527" v="524"/>
@@ -6556,8 +6636,8 @@
         </p:nvSpPr>
         <p:spPr>
           <a:xfrm>
-            <a:off x="0" y="0"/>
-            <a:ext cx="12222480" cy="6858000"/>
+            <a:off x="0" y="-138196"/>
+            <a:ext cx="12506566" cy="6996196"/>
           </a:xfrm>
           <a:custGeom>
             <a:avLst/>
@@ -6578,6 +6658,14 @@
               <a:gd name="connsiteY2" fmla="*/ 30480 h 6858000"/>
               <a:gd name="connsiteX3" fmla="*/ 0 w 12222480"/>
               <a:gd name="connsiteY3" fmla="*/ 6858000 h 6858000"/>
+              <a:gd name="connsiteX0" fmla="*/ 0 w 12506566"/>
+              <a:gd name="connsiteY0" fmla="*/ 6996196 h 6996196"/>
+              <a:gd name="connsiteX1" fmla="*/ 0 w 12506566"/>
+              <a:gd name="connsiteY1" fmla="*/ 138196 h 6996196"/>
+              <a:gd name="connsiteX2" fmla="*/ 12506566 w 12506566"/>
+              <a:gd name="connsiteY2" fmla="*/ 0 h 6996196"/>
+              <a:gd name="connsiteX3" fmla="*/ 0 w 12506566"/>
+              <a:gd name="connsiteY3" fmla="*/ 6996196 h 6996196"/>
             </a:gdLst>
             <a:ahLst/>
             <a:cxnLst>
@@ -6596,18 +6684,18 @@
             </a:cxnLst>
             <a:rect l="l" t="t" r="r" b="b"/>
             <a:pathLst>
-              <a:path w="12222480" h="6858000">
+              <a:path w="12506566" h="6996196">
                 <a:moveTo>
-                  <a:pt x="0" y="6858000"/>
+                  <a:pt x="0" y="6996196"/>
                 </a:moveTo>
                 <a:lnTo>
-                  <a:pt x="0" y="0"/>
+                  <a:pt x="0" y="138196"/>
                 </a:lnTo>
                 <a:lnTo>
-                  <a:pt x="12222480" y="30480"/>
+                  <a:pt x="12506566" y="0"/>
                 </a:lnTo>
                 <a:lnTo>
-                  <a:pt x="0" y="6858000"/>
+                  <a:pt x="0" y="6996196"/>
                 </a:lnTo>
                 <a:close/>
               </a:path>
@@ -6638,7 +6726,7 @@
           <a:lstStyle/>
           <a:p>
             <a:pPr algn="ctr"/>
-            <a:endParaRPr lang="es-ES"/>
+            <a:endParaRPr lang="es-ES" dirty="0"/>
           </a:p>
         </p:txBody>
       </p:sp>
@@ -6714,10 +6802,612 @@
           </a:prstGeom>
         </p:spPr>
       </p:pic>
+      <p:sp>
+        <p:nvSpPr>
+          <p:cNvPr id="3" name="CuadroTexto 2">
+            <a:extLst>
+              <a:ext uri="{FF2B5EF4-FFF2-40B4-BE49-F238E27FC236}">
+                <a16:creationId xmlns:a16="http://schemas.microsoft.com/office/drawing/2014/main" id="{89A11176-808E-50D5-24F3-1CE4E0E618E3}"/>
+              </a:ext>
+            </a:extLst>
+          </p:cNvPr>
+          <p:cNvSpPr txBox="1"/>
+          <p:nvPr/>
+        </p:nvSpPr>
+        <p:spPr>
+          <a:xfrm>
+            <a:off x="189248" y="246617"/>
+            <a:ext cx="6939521" cy="477054"/>
+          </a:xfrm>
+          <a:prstGeom prst="rect">
+            <a:avLst/>
+          </a:prstGeom>
+          <a:noFill/>
+        </p:spPr>
+        <p:txBody>
+          <a:bodyPr wrap="square" rtlCol="0">
+            <a:spAutoFit/>
+          </a:bodyPr>
+          <a:lstStyle/>
+          <a:p>
+            <a:r>
+              <a:rPr lang="es-ES" sz="2500" dirty="0">
+                <a:solidFill>
+                  <a:schemeClr val="bg1"/>
+                </a:solidFill>
+              </a:rPr>
+              <a:t>1938 </a:t>
+            </a:r>
+            <a:r>
+              <a:rPr lang="es-ES" sz="2500" dirty="0">
+                <a:solidFill>
+                  <a:schemeClr val="bg1"/>
+                </a:solidFill>
+                <a:sym typeface="Wingdings" panose="05000000000000000000" pitchFamily="2" charset="2"/>
+              </a:rPr>
+              <a:t>- 1959</a:t>
+            </a:r>
+            <a:endParaRPr lang="es-ES" sz="2500" dirty="0">
+              <a:solidFill>
+                <a:schemeClr val="bg1"/>
+              </a:solidFill>
+            </a:endParaRPr>
+          </a:p>
+        </p:txBody>
+      </p:sp>
+      <p:sp>
+        <p:nvSpPr>
+          <p:cNvPr id="4" name="CuadroTexto 3">
+            <a:extLst>
+              <a:ext uri="{FF2B5EF4-FFF2-40B4-BE49-F238E27FC236}">
+                <a16:creationId xmlns:a16="http://schemas.microsoft.com/office/drawing/2014/main" id="{FA656749-8259-EBBB-6F78-A3976723CFE1}"/>
+              </a:ext>
+            </a:extLst>
+          </p:cNvPr>
+          <p:cNvSpPr txBox="1"/>
+          <p:nvPr/>
+        </p:nvSpPr>
+        <p:spPr>
+          <a:xfrm>
+            <a:off x="189248" y="851744"/>
+            <a:ext cx="7933820" cy="2031325"/>
+          </a:xfrm>
+          <a:prstGeom prst="rect">
+            <a:avLst/>
+          </a:prstGeom>
+          <a:noFill/>
+        </p:spPr>
+        <p:txBody>
+          <a:bodyPr wrap="square" rtlCol="0">
+            <a:spAutoFit/>
+          </a:bodyPr>
+          <a:lstStyle/>
+          <a:p>
+            <a:r>
+              <a:rPr lang="en-US" dirty="0">
+                <a:solidFill>
+                  <a:schemeClr val="bg1"/>
+                </a:solidFill>
+              </a:rPr>
+              <a:t>The first generation of computers marked a before and after in the history of computing.</a:t>
+            </a:r>
+          </a:p>
+          <a:p>
+            <a:endParaRPr lang="en-US" dirty="0">
+              <a:solidFill>
+                <a:schemeClr val="bg1"/>
+              </a:solidFill>
+            </a:endParaRPr>
+          </a:p>
+          <a:p>
+            <a:r>
+              <a:rPr lang="en-US" dirty="0">
+                <a:solidFill>
+                  <a:schemeClr val="bg1"/>
+                </a:solidFill>
+              </a:rPr>
+              <a:t>Despite their limitations, these computers paved the way for future advances.</a:t>
+            </a:r>
+          </a:p>
+          <a:p>
+            <a:pPr algn="ctr"/>
+            <a:endParaRPr lang="en-US" dirty="0">
+              <a:solidFill>
+                <a:schemeClr val="bg1"/>
+              </a:solidFill>
+            </a:endParaRPr>
+          </a:p>
+          <a:p>
+            <a:r>
+              <a:rPr lang="en-US" dirty="0">
+                <a:solidFill>
+                  <a:schemeClr val="bg1"/>
+                </a:solidFill>
+              </a:rPr>
+              <a:t>The development of the Atanasoff Berry computer and the Von Neumann architecture laid the foundation for the next generations of computers.</a:t>
+            </a:r>
+            <a:endParaRPr lang="es-ES" dirty="0">
+              <a:solidFill>
+                <a:schemeClr val="bg1"/>
+              </a:solidFill>
+            </a:endParaRPr>
+          </a:p>
+        </p:txBody>
+      </p:sp>
     </p:spTree>
     <p:extLst>
       <p:ext uri="{BB962C8B-B14F-4D97-AF65-F5344CB8AC3E}">
         <p14:creationId xmlns:p14="http://schemas.microsoft.com/office/powerpoint/2010/main" val="2070359962"/>
+      </p:ext>
+    </p:extLst>
+  </p:cSld>
+  <p:clrMapOvr>
+    <a:masterClrMapping/>
+  </p:clrMapOvr>
+  <mc:AlternateContent xmlns:mc="http://schemas.openxmlformats.org/markup-compatibility/2006" xmlns:p159="http://schemas.microsoft.com/office/powerpoint/2015/09/main">
+    <mc:Choice Requires="p159">
+      <p:transition xmlns:p14="http://schemas.microsoft.com/office/powerpoint/2010/main" spd="slow" p14:dur="2000">
+        <p159:morph option="byObject"/>
+      </p:transition>
+    </mc:Choice>
+    <mc:Fallback xmlns="">
+      <p:transition spd="slow">
+        <p:fade/>
+      </p:transition>
+    </mc:Fallback>
+  </mc:AlternateContent>
+</p:sld>
+</file>
+
+<file path=ppt/slides/slide5.xml><?xml version="1.0" encoding="utf-8"?>
+<p:sld xmlns:a="http://schemas.openxmlformats.org/drawingml/2006/main" xmlns:r="http://schemas.openxmlformats.org/officeDocument/2006/relationships" xmlns:p="http://schemas.openxmlformats.org/presentationml/2006/main">
+  <p:cSld>
+    <p:spTree>
+      <p:nvGrpSpPr>
+        <p:cNvPr id="1" name=""/>
+        <p:cNvGrpSpPr/>
+        <p:nvPr/>
+      </p:nvGrpSpPr>
+      <p:grpSpPr>
+        <a:xfrm>
+          <a:off x="0" y="0"/>
+          <a:ext cx="0" cy="0"/>
+          <a:chOff x="0" y="0"/>
+          <a:chExt cx="0" cy="0"/>
+        </a:xfrm>
+      </p:grpSpPr>
+      <p:sp>
+        <p:nvSpPr>
+          <p:cNvPr id="5" name="Triángulo rectángulo 15">
+            <a:extLst>
+              <a:ext uri="{FF2B5EF4-FFF2-40B4-BE49-F238E27FC236}">
+                <a16:creationId xmlns:a16="http://schemas.microsoft.com/office/drawing/2014/main" id="{B1F973F9-0C83-7DA6-549A-C2B958781C5B}"/>
+              </a:ext>
+            </a:extLst>
+          </p:cNvPr>
+          <p:cNvSpPr/>
+          <p:nvPr/>
+        </p:nvSpPr>
+        <p:spPr>
+          <a:xfrm>
+            <a:off x="0" y="-138196"/>
+            <a:ext cx="12506566" cy="7054812"/>
+          </a:xfrm>
+          <a:custGeom>
+            <a:avLst/>
+            <a:gdLst>
+              <a:gd name="connsiteX0" fmla="*/ 0 w 12192000"/>
+              <a:gd name="connsiteY0" fmla="*/ 6858000 h 6858000"/>
+              <a:gd name="connsiteX1" fmla="*/ 0 w 12192000"/>
+              <a:gd name="connsiteY1" fmla="*/ 0 h 6858000"/>
+              <a:gd name="connsiteX2" fmla="*/ 12192000 w 12192000"/>
+              <a:gd name="connsiteY2" fmla="*/ 6858000 h 6858000"/>
+              <a:gd name="connsiteX3" fmla="*/ 0 w 12192000"/>
+              <a:gd name="connsiteY3" fmla="*/ 6858000 h 6858000"/>
+              <a:gd name="connsiteX0" fmla="*/ 0 w 12222480"/>
+              <a:gd name="connsiteY0" fmla="*/ 6858000 h 6858000"/>
+              <a:gd name="connsiteX1" fmla="*/ 0 w 12222480"/>
+              <a:gd name="connsiteY1" fmla="*/ 0 h 6858000"/>
+              <a:gd name="connsiteX2" fmla="*/ 12222480 w 12222480"/>
+              <a:gd name="connsiteY2" fmla="*/ 30480 h 6858000"/>
+              <a:gd name="connsiteX3" fmla="*/ 0 w 12222480"/>
+              <a:gd name="connsiteY3" fmla="*/ 6858000 h 6858000"/>
+              <a:gd name="connsiteX0" fmla="*/ 0 w 12506566"/>
+              <a:gd name="connsiteY0" fmla="*/ 6996196 h 6996196"/>
+              <a:gd name="connsiteX1" fmla="*/ 0 w 12506566"/>
+              <a:gd name="connsiteY1" fmla="*/ 138196 h 6996196"/>
+              <a:gd name="connsiteX2" fmla="*/ 12506566 w 12506566"/>
+              <a:gd name="connsiteY2" fmla="*/ 0 h 6996196"/>
+              <a:gd name="connsiteX3" fmla="*/ 0 w 12506566"/>
+              <a:gd name="connsiteY3" fmla="*/ 6996196 h 6996196"/>
+              <a:gd name="connsiteX0" fmla="*/ 0 w 12506566"/>
+              <a:gd name="connsiteY0" fmla="*/ 6996196 h 7054812"/>
+              <a:gd name="connsiteX1" fmla="*/ 12238892 w 12506566"/>
+              <a:gd name="connsiteY1" fmla="*/ 7054812 h 7054812"/>
+              <a:gd name="connsiteX2" fmla="*/ 12506566 w 12506566"/>
+              <a:gd name="connsiteY2" fmla="*/ 0 h 7054812"/>
+              <a:gd name="connsiteX3" fmla="*/ 0 w 12506566"/>
+              <a:gd name="connsiteY3" fmla="*/ 6996196 h 7054812"/>
+            </a:gdLst>
+            <a:ahLst/>
+            <a:cxnLst>
+              <a:cxn ang="0">
+                <a:pos x="connsiteX0" y="connsiteY0"/>
+              </a:cxn>
+              <a:cxn ang="0">
+                <a:pos x="connsiteX1" y="connsiteY1"/>
+              </a:cxn>
+              <a:cxn ang="0">
+                <a:pos x="connsiteX2" y="connsiteY2"/>
+              </a:cxn>
+              <a:cxn ang="0">
+                <a:pos x="connsiteX3" y="connsiteY3"/>
+              </a:cxn>
+            </a:cxnLst>
+            <a:rect l="l" t="t" r="r" b="b"/>
+            <a:pathLst>
+              <a:path w="12506566" h="7054812">
+                <a:moveTo>
+                  <a:pt x="0" y="6996196"/>
+                </a:moveTo>
+                <a:lnTo>
+                  <a:pt x="12238892" y="7054812"/>
+                </a:lnTo>
+                <a:lnTo>
+                  <a:pt x="12506566" y="0"/>
+                </a:lnTo>
+                <a:lnTo>
+                  <a:pt x="0" y="6996196"/>
+                </a:lnTo>
+                <a:close/>
+              </a:path>
+            </a:pathLst>
+          </a:custGeom>
+          <a:solidFill>
+            <a:schemeClr val="tx2"/>
+          </a:solidFill>
+        </p:spPr>
+        <p:style>
+          <a:lnRef idx="2">
+            <a:schemeClr val="accent1">
+              <a:shade val="15000"/>
+            </a:schemeClr>
+          </a:lnRef>
+          <a:fillRef idx="1">
+            <a:schemeClr val="accent1"/>
+          </a:fillRef>
+          <a:effectRef idx="0">
+            <a:schemeClr val="accent1"/>
+          </a:effectRef>
+          <a:fontRef idx="minor">
+            <a:schemeClr val="lt1"/>
+          </a:fontRef>
+        </p:style>
+        <p:txBody>
+          <a:bodyPr rtlCol="0" anchor="ctr"/>
+          <a:lstStyle/>
+          <a:p>
+            <a:pPr algn="ctr"/>
+            <a:endParaRPr lang="es-ES" dirty="0"/>
+          </a:p>
+        </p:txBody>
+      </p:sp>
+      <p:sp>
+        <p:nvSpPr>
+          <p:cNvPr id="16" name="Triángulo rectángulo 15">
+            <a:extLst>
+              <a:ext uri="{FF2B5EF4-FFF2-40B4-BE49-F238E27FC236}">
+                <a16:creationId xmlns:a16="http://schemas.microsoft.com/office/drawing/2014/main" id="{B74D8065-916C-C2F8-7443-FEE81D22F0AC}"/>
+              </a:ext>
+            </a:extLst>
+          </p:cNvPr>
+          <p:cNvSpPr/>
+          <p:nvPr/>
+        </p:nvSpPr>
+        <p:spPr>
+          <a:xfrm>
+            <a:off x="-11808173" y="-7281518"/>
+            <a:ext cx="12506566" cy="6996196"/>
+          </a:xfrm>
+          <a:custGeom>
+            <a:avLst/>
+            <a:gdLst>
+              <a:gd name="connsiteX0" fmla="*/ 0 w 12192000"/>
+              <a:gd name="connsiteY0" fmla="*/ 6858000 h 6858000"/>
+              <a:gd name="connsiteX1" fmla="*/ 0 w 12192000"/>
+              <a:gd name="connsiteY1" fmla="*/ 0 h 6858000"/>
+              <a:gd name="connsiteX2" fmla="*/ 12192000 w 12192000"/>
+              <a:gd name="connsiteY2" fmla="*/ 6858000 h 6858000"/>
+              <a:gd name="connsiteX3" fmla="*/ 0 w 12192000"/>
+              <a:gd name="connsiteY3" fmla="*/ 6858000 h 6858000"/>
+              <a:gd name="connsiteX0" fmla="*/ 0 w 12222480"/>
+              <a:gd name="connsiteY0" fmla="*/ 6858000 h 6858000"/>
+              <a:gd name="connsiteX1" fmla="*/ 0 w 12222480"/>
+              <a:gd name="connsiteY1" fmla="*/ 0 h 6858000"/>
+              <a:gd name="connsiteX2" fmla="*/ 12222480 w 12222480"/>
+              <a:gd name="connsiteY2" fmla="*/ 30480 h 6858000"/>
+              <a:gd name="connsiteX3" fmla="*/ 0 w 12222480"/>
+              <a:gd name="connsiteY3" fmla="*/ 6858000 h 6858000"/>
+              <a:gd name="connsiteX0" fmla="*/ 0 w 12506566"/>
+              <a:gd name="connsiteY0" fmla="*/ 6996196 h 6996196"/>
+              <a:gd name="connsiteX1" fmla="*/ 0 w 12506566"/>
+              <a:gd name="connsiteY1" fmla="*/ 138196 h 6996196"/>
+              <a:gd name="connsiteX2" fmla="*/ 12506566 w 12506566"/>
+              <a:gd name="connsiteY2" fmla="*/ 0 h 6996196"/>
+              <a:gd name="connsiteX3" fmla="*/ 0 w 12506566"/>
+              <a:gd name="connsiteY3" fmla="*/ 6996196 h 6996196"/>
+            </a:gdLst>
+            <a:ahLst/>
+            <a:cxnLst>
+              <a:cxn ang="0">
+                <a:pos x="connsiteX0" y="connsiteY0"/>
+              </a:cxn>
+              <a:cxn ang="0">
+                <a:pos x="connsiteX1" y="connsiteY1"/>
+              </a:cxn>
+              <a:cxn ang="0">
+                <a:pos x="connsiteX2" y="connsiteY2"/>
+              </a:cxn>
+              <a:cxn ang="0">
+                <a:pos x="connsiteX3" y="connsiteY3"/>
+              </a:cxn>
+            </a:cxnLst>
+            <a:rect l="l" t="t" r="r" b="b"/>
+            <a:pathLst>
+              <a:path w="12506566" h="6996196">
+                <a:moveTo>
+                  <a:pt x="0" y="6996196"/>
+                </a:moveTo>
+                <a:lnTo>
+                  <a:pt x="0" y="138196"/>
+                </a:lnTo>
+                <a:lnTo>
+                  <a:pt x="12506566" y="0"/>
+                </a:lnTo>
+                <a:lnTo>
+                  <a:pt x="0" y="6996196"/>
+                </a:lnTo>
+                <a:close/>
+              </a:path>
+            </a:pathLst>
+          </a:custGeom>
+          <a:solidFill>
+            <a:schemeClr val="tx2"/>
+          </a:solidFill>
+        </p:spPr>
+        <p:style>
+          <a:lnRef idx="2">
+            <a:schemeClr val="accent1">
+              <a:shade val="15000"/>
+            </a:schemeClr>
+          </a:lnRef>
+          <a:fillRef idx="1">
+            <a:schemeClr val="accent1"/>
+          </a:fillRef>
+          <a:effectRef idx="0">
+            <a:schemeClr val="accent1"/>
+          </a:effectRef>
+          <a:fontRef idx="minor">
+            <a:schemeClr val="lt1"/>
+          </a:fontRef>
+        </p:style>
+        <p:txBody>
+          <a:bodyPr rtlCol="0" anchor="ctr"/>
+          <a:lstStyle/>
+          <a:p>
+            <a:pPr algn="ctr"/>
+            <a:endParaRPr lang="es-ES" dirty="0"/>
+          </a:p>
+        </p:txBody>
+      </p:sp>
+      <p:pic>
+        <p:nvPicPr>
+          <p:cNvPr id="18" name="Imagen 17" descr="Foto en blanco y negro de una pareja&#10;&#10;Descripción generada automáticamente con confianza baja">
+            <a:extLst>
+              <a:ext uri="{FF2B5EF4-FFF2-40B4-BE49-F238E27FC236}">
+                <a16:creationId xmlns:a16="http://schemas.microsoft.com/office/drawing/2014/main" id="{3E712D82-1072-3190-F07A-618129E3A17D}"/>
+              </a:ext>
+            </a:extLst>
+          </p:cNvPr>
+          <p:cNvPicPr>
+            <a:picLocks noChangeAspect="1"/>
+          </p:cNvPicPr>
+          <p:nvPr/>
+        </p:nvPicPr>
+        <p:blipFill>
+          <a:blip r:embed="rId2">
+            <a:extLst>
+              <a:ext uri="{28A0092B-C50C-407E-A947-70E740481C1C}">
+                <a14:useLocalDpi xmlns:a14="http://schemas.microsoft.com/office/drawing/2010/main" val="0"/>
+              </a:ext>
+            </a:extLst>
+          </a:blip>
+          <a:stretch>
+            <a:fillRect/>
+          </a:stretch>
+        </p:blipFill>
+        <p:spPr>
+          <a:xfrm>
+            <a:off x="21518729" y="1867406"/>
+            <a:ext cx="3053933" cy="4073183"/>
+          </a:xfrm>
+          <a:prstGeom prst="rect">
+            <a:avLst/>
+          </a:prstGeom>
+        </p:spPr>
+      </p:pic>
+      <p:pic>
+        <p:nvPicPr>
+          <p:cNvPr id="21" name="Imagen 20">
+            <a:extLst>
+              <a:ext uri="{FF2B5EF4-FFF2-40B4-BE49-F238E27FC236}">
+                <a16:creationId xmlns:a16="http://schemas.microsoft.com/office/drawing/2014/main" id="{3997A5C5-B5FB-A1F3-A6AA-7B216FBA7E86}"/>
+              </a:ext>
+            </a:extLst>
+          </p:cNvPr>
+          <p:cNvPicPr>
+            <a:picLocks noChangeAspect="1"/>
+          </p:cNvPicPr>
+          <p:nvPr/>
+        </p:nvPicPr>
+        <p:blipFill>
+          <a:blip r:embed="rId3">
+            <a:extLst>
+              <a:ext uri="{28A0092B-C50C-407E-A947-70E740481C1C}">
+                <a14:useLocalDpi xmlns:a14="http://schemas.microsoft.com/office/drawing/2010/main" val="0"/>
+              </a:ext>
+            </a:extLst>
+          </a:blip>
+          <a:stretch>
+            <a:fillRect/>
+          </a:stretch>
+        </p:blipFill>
+        <p:spPr>
+          <a:xfrm rot="20767758">
+            <a:off x="3448853" y="10284169"/>
+            <a:ext cx="3438311" cy="2433861"/>
+          </a:xfrm>
+          <a:prstGeom prst="rect">
+            <a:avLst/>
+          </a:prstGeom>
+        </p:spPr>
+      </p:pic>
+      <p:sp>
+        <p:nvSpPr>
+          <p:cNvPr id="3" name="CuadroTexto 2">
+            <a:extLst>
+              <a:ext uri="{FF2B5EF4-FFF2-40B4-BE49-F238E27FC236}">
+                <a16:creationId xmlns:a16="http://schemas.microsoft.com/office/drawing/2014/main" id="{89A11176-808E-50D5-24F3-1CE4E0E618E3}"/>
+              </a:ext>
+            </a:extLst>
+          </p:cNvPr>
+          <p:cNvSpPr txBox="1"/>
+          <p:nvPr/>
+        </p:nvSpPr>
+        <p:spPr>
+          <a:xfrm>
+            <a:off x="10293132" y="1216082"/>
+            <a:ext cx="6939521" cy="477054"/>
+          </a:xfrm>
+          <a:prstGeom prst="rect">
+            <a:avLst/>
+          </a:prstGeom>
+          <a:noFill/>
+        </p:spPr>
+        <p:txBody>
+          <a:bodyPr wrap="square" rtlCol="0">
+            <a:spAutoFit/>
+          </a:bodyPr>
+          <a:lstStyle/>
+          <a:p>
+            <a:r>
+              <a:rPr lang="es-ES" sz="2500" dirty="0">
+                <a:solidFill>
+                  <a:schemeClr val="bg1"/>
+                </a:solidFill>
+              </a:rPr>
+              <a:t>1938 </a:t>
+            </a:r>
+            <a:r>
+              <a:rPr lang="es-ES" sz="2500" dirty="0">
+                <a:solidFill>
+                  <a:schemeClr val="bg1"/>
+                </a:solidFill>
+                <a:sym typeface="Wingdings" panose="05000000000000000000" pitchFamily="2" charset="2"/>
+              </a:rPr>
+              <a:t>- 1959</a:t>
+            </a:r>
+            <a:endParaRPr lang="es-ES" sz="2500" dirty="0">
+              <a:solidFill>
+                <a:schemeClr val="bg1"/>
+              </a:solidFill>
+            </a:endParaRPr>
+          </a:p>
+        </p:txBody>
+      </p:sp>
+      <p:sp>
+        <p:nvSpPr>
+          <p:cNvPr id="4" name="CuadroTexto 3">
+            <a:extLst>
+              <a:ext uri="{FF2B5EF4-FFF2-40B4-BE49-F238E27FC236}">
+                <a16:creationId xmlns:a16="http://schemas.microsoft.com/office/drawing/2014/main" id="{FA656749-8259-EBBB-6F78-A3976723CFE1}"/>
+              </a:ext>
+            </a:extLst>
+          </p:cNvPr>
+          <p:cNvSpPr txBox="1"/>
+          <p:nvPr/>
+        </p:nvSpPr>
+        <p:spPr>
+          <a:xfrm>
+            <a:off x="4919452" y="3997857"/>
+            <a:ext cx="7933820" cy="2031325"/>
+          </a:xfrm>
+          <a:prstGeom prst="rect">
+            <a:avLst/>
+          </a:prstGeom>
+          <a:noFill/>
+        </p:spPr>
+        <p:txBody>
+          <a:bodyPr wrap="square" rtlCol="0">
+            <a:spAutoFit/>
+          </a:bodyPr>
+          <a:lstStyle/>
+          <a:p>
+            <a:r>
+              <a:rPr lang="en-US" dirty="0">
+                <a:solidFill>
+                  <a:schemeClr val="bg1"/>
+                </a:solidFill>
+              </a:rPr>
+              <a:t>The first generation of computers marked a before and after in the history of computing.</a:t>
+            </a:r>
+          </a:p>
+          <a:p>
+            <a:endParaRPr lang="en-US" dirty="0">
+              <a:solidFill>
+                <a:schemeClr val="bg1"/>
+              </a:solidFill>
+            </a:endParaRPr>
+          </a:p>
+          <a:p>
+            <a:r>
+              <a:rPr lang="en-US" dirty="0">
+                <a:solidFill>
+                  <a:schemeClr val="bg1"/>
+                </a:solidFill>
+              </a:rPr>
+              <a:t>Despite their limitations, these computers paved the way for future advances.</a:t>
+            </a:r>
+          </a:p>
+          <a:p>
+            <a:pPr algn="ctr"/>
+            <a:endParaRPr lang="en-US" dirty="0">
+              <a:solidFill>
+                <a:schemeClr val="bg1"/>
+              </a:solidFill>
+            </a:endParaRPr>
+          </a:p>
+          <a:p>
+            <a:r>
+              <a:rPr lang="en-US" dirty="0">
+                <a:solidFill>
+                  <a:schemeClr val="bg1"/>
+                </a:solidFill>
+              </a:rPr>
+              <a:t>The development of the Atanasoff Berry computer and the Von Neumann architecture laid the foundation for the next generations of computers.</a:t>
+            </a:r>
+            <a:endParaRPr lang="es-ES" dirty="0">
+              <a:solidFill>
+                <a:schemeClr val="bg1"/>
+              </a:solidFill>
+            </a:endParaRPr>
+          </a:p>
+        </p:txBody>
+      </p:sp>
+    </p:spTree>
+    <p:extLst>
+      <p:ext uri="{BB962C8B-B14F-4D97-AF65-F5344CB8AC3E}">
+        <p14:creationId xmlns:p14="http://schemas.microsoft.com/office/powerpoint/2010/main" val="2271487826"/>
       </p:ext>
     </p:extLst>
   </p:cSld>

</xml_diff>